<commit_message>
Fixed broken link to exercises pdf
</commit_message>
<xml_diff>
--- a/gft/Slides.pptx
+++ b/gft/Slides.pptx
@@ -140,6 +140,22 @@
       </a:defRPr>
     </a:lvl9pPr>
   </p:defaultTextStyle>
+  <p:extLst>
+    <p:ext uri="{EFAFB233-063F-42B5-8137-9DF3F51BA10A}">
+      <p15:sldGuideLst xmlns:p15="http://schemas.microsoft.com/office/powerpoint/2012/main">
+        <p15:guide id="1" orient="horz" pos="2160">
+          <p15:clr>
+            <a:srgbClr val="A4A3A4"/>
+          </p15:clr>
+        </p15:guide>
+        <p15:guide id="2" pos="2880">
+          <p15:clr>
+            <a:srgbClr val="A4A3A4"/>
+          </p15:clr>
+        </p15:guide>
+      </p15:sldGuideLst>
+    </p:ext>
+  </p:extLst>
 </p:presentation>
 </file>
 
@@ -446,7 +462,7 @@
             <a:fld id="{A84CA7B6-E562-1B4A-AE53-698AD93CDF13}" type="datetimeFigureOut">
               <a:rPr lang="en-US"/>
               <a:pPr/>
-              <a:t>4/15/2014</a:t>
+              <a:t>4/12/17</a:t>
             </a:fld>
             <a:endParaRPr lang="en-US"/>
           </a:p>
@@ -670,7 +686,7 @@
             <a:fld id="{01E8385B-8C97-9246-B6B0-262077A9F779}" type="datetimeFigureOut">
               <a:rPr lang="en-US"/>
               <a:pPr/>
-              <a:t>4/15/2014</a:t>
+              <a:t>4/12/17</a:t>
             </a:fld>
             <a:endParaRPr lang="en-US"/>
           </a:p>
@@ -1100,7 +1116,7 @@
             <a:fld id="{A2E1AC95-3BC2-6942-B87F-30B49E21E295}" type="datetimeFigureOut">
               <a:rPr lang="en-US"/>
               <a:pPr/>
-              <a:t>4/15/2014</a:t>
+              <a:t>4/12/17</a:t>
             </a:fld>
             <a:endParaRPr lang="en-US"/>
           </a:p>
@@ -1432,7 +1448,7 @@
             <a:fld id="{4E9BF2C7-021A-B842-BCD3-DDE8F6E0CF0D}" type="datetimeFigureOut">
               <a:rPr lang="en-US"/>
               <a:pPr/>
-              <a:t>4/15/2014</a:t>
+              <a:t>4/12/17</a:t>
             </a:fld>
             <a:endParaRPr lang="en-US"/>
           </a:p>
@@ -1898,7 +1914,7 @@
             <a:fld id="{15F36B5C-15F5-3146-870F-022F19FB2136}" type="datetimeFigureOut">
               <a:rPr lang="en-US"/>
               <a:pPr/>
-              <a:t>4/15/2014</a:t>
+              <a:t>4/12/17</a:t>
             </a:fld>
             <a:endParaRPr lang="en-US"/>
           </a:p>
@@ -2060,7 +2076,7 @@
             <a:fld id="{2358634F-7520-3240-877C-4BF289DE2E2C}" type="datetimeFigureOut">
               <a:rPr lang="en-US"/>
               <a:pPr/>
-              <a:t>4/15/2014</a:t>
+              <a:t>4/12/17</a:t>
             </a:fld>
             <a:endParaRPr lang="en-US"/>
           </a:p>
@@ -2199,7 +2215,7 @@
             <a:fld id="{CE404BA7-3AEC-C64C-92B5-E940984F29D2}" type="datetimeFigureOut">
               <a:rPr lang="en-US"/>
               <a:pPr/>
-              <a:t>4/15/2014</a:t>
+              <a:t>4/12/17</a:t>
             </a:fld>
             <a:endParaRPr lang="en-US"/>
           </a:p>
@@ -2520,7 +2536,7 @@
             <a:fld id="{E06D44E9-2FA8-1D47-8A8C-488941972A39}" type="datetimeFigureOut">
               <a:rPr lang="en-US"/>
               <a:pPr/>
-              <a:t>4/15/2014</a:t>
+              <a:t>4/12/17</a:t>
             </a:fld>
             <a:endParaRPr lang="en-US"/>
           </a:p>
@@ -2834,7 +2850,7 @@
             <a:fld id="{C93EC2F5-DF7A-284B-8645-3F5E07F6F357}" type="datetimeFigureOut">
               <a:rPr lang="en-US"/>
               <a:pPr/>
-              <a:t>4/15/2014</a:t>
+              <a:t>4/12/17</a:t>
             </a:fld>
             <a:endParaRPr lang="en-US"/>
           </a:p>
@@ -3964,24 +3980,12 @@
           </p:cNvPicPr>
           <p:nvPr/>
         </p:nvPicPr>
-        <mc:AlternateContent xmlns:mc="http://schemas.openxmlformats.org/markup-compatibility/2006">
-          <mc:Choice xmlns="" xmlns:mv="urn:schemas-microsoft-com:mac:vml" xmlns:ma="http://schemas.microsoft.com/office/mac/drawingml/2008/main" Requires="ma">
-            <p:blipFill>
-              <a:blip r:embed="rId2"/>
-              <a:stretch>
-                <a:fillRect/>
-              </a:stretch>
-            </p:blipFill>
-          </mc:Choice>
-          <mc:Fallback>
-            <p:blipFill>
-              <a:blip r:embed="rId3"/>
-              <a:stretch>
-                <a:fillRect/>
-              </a:stretch>
-            </p:blipFill>
-          </mc:Fallback>
-        </mc:AlternateContent>
+        <p:blipFill>
+          <a:blip r:embed="rId2"/>
+          <a:stretch>
+            <a:fillRect/>
+          </a:stretch>
+        </p:blipFill>
         <p:spPr>
           <a:xfrm>
             <a:off x="304800" y="1600200"/>
@@ -4125,24 +4129,12 @@
           </p:cNvPicPr>
           <p:nvPr/>
         </p:nvPicPr>
-        <mc:AlternateContent xmlns:mc="http://schemas.openxmlformats.org/markup-compatibility/2006">
-          <mc:Choice xmlns="" xmlns:mv="urn:schemas-microsoft-com:mac:vml" xmlns:ma="http://schemas.microsoft.com/office/mac/drawingml/2008/main" Requires="ma">
-            <p:blipFill>
-              <a:blip r:embed="rId2"/>
-              <a:stretch>
-                <a:fillRect/>
-              </a:stretch>
-            </p:blipFill>
-          </mc:Choice>
-          <mc:Fallback>
-            <p:blipFill>
-              <a:blip r:embed="rId3"/>
-              <a:stretch>
-                <a:fillRect/>
-              </a:stretch>
-            </p:blipFill>
-          </mc:Fallback>
-        </mc:AlternateContent>
+        <p:blipFill>
+          <a:blip r:embed="rId2"/>
+          <a:stretch>
+            <a:fillRect/>
+          </a:stretch>
+        </p:blipFill>
         <p:spPr>
           <a:xfrm>
             <a:off x="2286000" y="380999"/>
@@ -4208,11 +4200,7 @@
             <a:pPr algn="ctr"/>
             <a:r>
               <a:rPr lang="en-US" dirty="0" smtClean="0"/>
-              <a:t>…let’s get under way</a:t>
-            </a:r>
-            <a:r>
-              <a:rPr lang="en-US" dirty="0" smtClean="0"/>
-              <a:t>…</a:t>
+              <a:t>…let’s get under way…</a:t>
             </a:r>
             <a:br>
               <a:rPr lang="en-US" dirty="0" smtClean="0"/>
@@ -4230,8 +4218,15 @@
             </a:r>
             <a:r>
               <a:rPr lang="en-US" dirty="0"/>
-              <a:t>for this course are available at </a:t>
-            </a:r>
+              <a:t>for this course are available </a:t>
+            </a:r>
+            <a:r>
+              <a:rPr lang="en-US" dirty="0" smtClean="0"/>
+              <a:t>at</a:t>
+            </a:r>
+            <a:br>
+              <a:rPr lang="en-US" dirty="0" smtClean="0"/>
+            </a:br>
             <a:r>
               <a:rPr lang="en-US" dirty="0">
                 <a:hlinkClick r:id="rId2"/>
@@ -4242,10 +4237,16 @@
               <a:rPr lang="en-US" dirty="0" smtClean="0">
                 <a:hlinkClick r:id="rId2"/>
               </a:rPr>
-              <a:t>github.com/IntersectAustralia/TrainingMaterials/blob/master/DataVisualisationWithGoogleFusionTables/Exercises.pdf?raw=true</a:t>
-            </a:r>
-            <a:r>
-              <a:rPr lang="en-US" dirty="0" smtClean="0"/>
+              <a:t>goo.gl</a:t>
+            </a:r>
+            <a:r>
+              <a:rPr lang="en-US" smtClean="0">
+                <a:hlinkClick r:id="rId2"/>
+              </a:rPr>
+              <a:t>/NnThp6</a:t>
+            </a:r>
+            <a:r>
+              <a:rPr lang="en-US" smtClean="0"/>
               <a:t> </a:t>
             </a:r>
             <a:endParaRPr lang="en-US" dirty="0"/>

</xml_diff>